<commit_message>
Doc: Updates on documents
</commit_message>
<xml_diff>
--- a/doc/20191203_1626_Poster.pptx
+++ b/doc/20191203_1626_Poster.pptx
@@ -337,7 +337,7 @@
             <a:fld id="{1E839B23-D297-4C69-94B9-D5D67910C1C5}" type="datetimeFigureOut">
               <a:rPr lang="pt-BR"/>
               <a:pPr/>
-              <a:t>03/12/2019</a:t>
+              <a:t>04/12/2019</a:t>
             </a:fld>
             <a:endParaRPr lang="pt-BR"/>
           </a:p>
@@ -517,7 +517,7 @@
             <a:fld id="{E3DE16A2-24E1-4569-AC32-F4599B96F368}" type="datetimeFigureOut">
               <a:rPr lang="pt-BR"/>
               <a:pPr/>
-              <a:t>03/12/2019</a:t>
+              <a:t>04/12/2019</a:t>
             </a:fld>
             <a:endParaRPr lang="pt-BR"/>
           </a:p>
@@ -707,7 +707,7 @@
             <a:fld id="{0FAA2285-42A5-4602-8F50-811F3B8BBEE4}" type="datetimeFigureOut">
               <a:rPr lang="pt-BR"/>
               <a:pPr/>
-              <a:t>03/12/2019</a:t>
+              <a:t>04/12/2019</a:t>
             </a:fld>
             <a:endParaRPr lang="pt-BR"/>
           </a:p>
@@ -887,7 +887,7 @@
             <a:fld id="{A7FE39B1-1C6D-4CD4-BA59-97DF9474006D}" type="datetimeFigureOut">
               <a:rPr lang="pt-BR"/>
               <a:pPr/>
-              <a:t>03/12/2019</a:t>
+              <a:t>04/12/2019</a:t>
             </a:fld>
             <a:endParaRPr lang="pt-BR"/>
           </a:p>
@@ -1144,7 +1144,7 @@
             <a:fld id="{78280F46-5C74-42D4-AD20-329FCC3EB7B4}" type="datetimeFigureOut">
               <a:rPr lang="pt-BR"/>
               <a:pPr/>
-              <a:t>03/12/2019</a:t>
+              <a:t>04/12/2019</a:t>
             </a:fld>
             <a:endParaRPr lang="pt-BR"/>
           </a:p>
@@ -1441,7 +1441,7 @@
             <a:fld id="{CB1C6ED0-343F-4221-AE3F-7C8ED5B1EA7D}" type="datetimeFigureOut">
               <a:rPr lang="pt-BR"/>
               <a:pPr/>
-              <a:t>03/12/2019</a:t>
+              <a:t>04/12/2019</a:t>
             </a:fld>
             <a:endParaRPr lang="pt-BR"/>
           </a:p>
@@ -1872,7 +1872,7 @@
             <a:fld id="{11C41CC9-3DC5-45D9-8F82-DDBEABD672A7}" type="datetimeFigureOut">
               <a:rPr lang="pt-BR"/>
               <a:pPr/>
-              <a:t>03/12/2019</a:t>
+              <a:t>04/12/2019</a:t>
             </a:fld>
             <a:endParaRPr lang="pt-BR"/>
           </a:p>
@@ -2001,7 +2001,7 @@
             <a:fld id="{E0968910-A46E-4BD0-B6C5-4EFDB129814F}" type="datetimeFigureOut">
               <a:rPr lang="pt-BR"/>
               <a:pPr/>
-              <a:t>03/12/2019</a:t>
+              <a:t>04/12/2019</a:t>
             </a:fld>
             <a:endParaRPr lang="pt-BR"/>
           </a:p>
@@ -2108,7 +2108,7 @@
             <a:fld id="{3B404536-C8CD-4BCE-935C-AEE91DDC5FBB}" type="datetimeFigureOut">
               <a:rPr lang="pt-BR"/>
               <a:pPr/>
-              <a:t>03/12/2019</a:t>
+              <a:t>04/12/2019</a:t>
             </a:fld>
             <a:endParaRPr lang="pt-BR"/>
           </a:p>
@@ -2395,7 +2395,7 @@
             <a:fld id="{A6803685-1BB9-4227-B69F-6105DE13E471}" type="datetimeFigureOut">
               <a:rPr lang="pt-BR"/>
               <a:pPr/>
-              <a:t>03/12/2019</a:t>
+              <a:t>04/12/2019</a:t>
             </a:fld>
             <a:endParaRPr lang="pt-BR"/>
           </a:p>
@@ -2662,7 +2662,7 @@
             <a:fld id="{105313E8-7250-48B5-9E67-E30E71424C6D}" type="datetimeFigureOut">
               <a:rPr lang="pt-BR"/>
               <a:pPr/>
-              <a:t>03/12/2019</a:t>
+              <a:t>04/12/2019</a:t>
             </a:fld>
             <a:endParaRPr lang="pt-BR"/>
           </a:p>
@@ -2905,7 +2905,7 @@
             <a:fld id="{BB2D2FE6-648F-4D02-8165-E6DE94804BE9}" type="datetimeFigureOut">
               <a:rPr lang="pt-BR"/>
               <a:pPr/>
-              <a:t>03/12/2019</a:t>
+              <a:t>04/12/2019</a:t>
             </a:fld>
             <a:endParaRPr lang="pt-BR"/>
           </a:p>
@@ -5688,7 +5688,13 @@
                 <a:rPr lang="pt-BR" sz="1773" dirty="0">
                   <a:latin typeface="+mn-lt"/>
                 </a:rPr>
-                <a:t>Agradecimentos ao LAPIX e ao professor Aldo por disponibilizar tópicos atuais e online sob demanda e ao LMP por disponibilizar as imagens e partes do equipamento para avaliação.</a:t>
+                <a:t>Agradecimentos ao LAPIX e ao professor Aldo por disponibilizar tópicos atuais e online sob demanda e ao LMP por disponibilizar as imagens e partes do equipamento para </a:t>
+              </a:r>
+              <a:r>
+                <a:rPr lang="pt-BR" sz="1773">
+                  <a:latin typeface="+mn-lt"/>
+                </a:rPr>
+                <a:t>avaliação. </a:t>
               </a:r>
               <a:endParaRPr lang="pt-BR" sz="1773" i="1" dirty="0">
                 <a:latin typeface="+mn-lt"/>

</xml_diff>